<commit_message>
Added navigation diagram in slides
</commit_message>
<xml_diff>
--- a/final-presentation.pptx
+++ b/final-presentation.pptx
@@ -12,7 +12,7 @@
     <p:sldId id="257" r:id="rId3"/>
     <p:sldId id="258" r:id="rId4"/>
     <p:sldId id="259" r:id="rId5"/>
-    <p:sldId id="260" r:id="rId6"/>
+    <p:sldId id="267" r:id="rId6"/>
     <p:sldId id="261" r:id="rId7"/>
     <p:sldId id="262" r:id="rId8"/>
     <p:sldId id="263" r:id="rId9"/>
@@ -256,7 +256,7 @@
           <a:p>
             <a:fld id="{B7268E1E-0E44-426D-905E-8AD9B19D2182}" type="datetimeFigureOut">
               <a:rPr lang="cs-CZ" smtClean="0"/>
-              <a:t>08.11.2023</a:t>
+              <a:t>09.11.2023</a:t>
             </a:fld>
             <a:endParaRPr lang="cs-CZ"/>
           </a:p>
@@ -1227,7 +1227,7 @@
             <a:fld id="{1D8BD707-D9CF-40AE-B4C6-C98DA3205C09}" type="datetimeFigureOut">
               <a:rPr lang="en-US" smtClean="0"/>
               <a:pPr/>
-              <a:t>11/8/23</a:t>
+              <a:t>11/9/23</a:t>
             </a:fld>
             <a:endParaRPr lang="en-US"/>
           </a:p>
@@ -1392,7 +1392,7 @@
             <a:fld id="{1D8BD707-D9CF-40AE-B4C6-C98DA3205C09}" type="datetimeFigureOut">
               <a:rPr lang="en-US" smtClean="0"/>
               <a:pPr/>
-              <a:t>11/8/23</a:t>
+              <a:t>11/9/23</a:t>
             </a:fld>
             <a:endParaRPr lang="en-US"/>
           </a:p>
@@ -1567,7 +1567,7 @@
             <a:fld id="{1D8BD707-D9CF-40AE-B4C6-C98DA3205C09}" type="datetimeFigureOut">
               <a:rPr lang="en-US" smtClean="0"/>
               <a:pPr/>
-              <a:t>11/8/23</a:t>
+              <a:t>11/9/23</a:t>
             </a:fld>
             <a:endParaRPr lang="en-US"/>
           </a:p>
@@ -1732,7 +1732,7 @@
             <a:fld id="{1D8BD707-D9CF-40AE-B4C6-C98DA3205C09}" type="datetimeFigureOut">
               <a:rPr lang="en-US" smtClean="0"/>
               <a:pPr/>
-              <a:t>11/8/23</a:t>
+              <a:t>11/9/23</a:t>
             </a:fld>
             <a:endParaRPr lang="en-US"/>
           </a:p>
@@ -1974,7 +1974,7 @@
             <a:fld id="{1D8BD707-D9CF-40AE-B4C6-C98DA3205C09}" type="datetimeFigureOut">
               <a:rPr lang="en-US" smtClean="0"/>
               <a:pPr/>
-              <a:t>11/8/23</a:t>
+              <a:t>11/9/23</a:t>
             </a:fld>
             <a:endParaRPr lang="en-US"/>
           </a:p>
@@ -2256,7 +2256,7 @@
             <a:fld id="{1D8BD707-D9CF-40AE-B4C6-C98DA3205C09}" type="datetimeFigureOut">
               <a:rPr lang="en-US" smtClean="0"/>
               <a:pPr/>
-              <a:t>11/8/23</a:t>
+              <a:t>11/9/23</a:t>
             </a:fld>
             <a:endParaRPr lang="en-US"/>
           </a:p>
@@ -2672,7 +2672,7 @@
             <a:fld id="{1D8BD707-D9CF-40AE-B4C6-C98DA3205C09}" type="datetimeFigureOut">
               <a:rPr lang="en-US" smtClean="0"/>
               <a:pPr/>
-              <a:t>11/8/23</a:t>
+              <a:t>11/9/23</a:t>
             </a:fld>
             <a:endParaRPr lang="en-US"/>
           </a:p>
@@ -2786,7 +2786,7 @@
             <a:fld id="{1D8BD707-D9CF-40AE-B4C6-C98DA3205C09}" type="datetimeFigureOut">
               <a:rPr lang="en-US" smtClean="0"/>
               <a:pPr/>
-              <a:t>11/8/23</a:t>
+              <a:t>11/9/23</a:t>
             </a:fld>
             <a:endParaRPr lang="en-US"/>
           </a:p>
@@ -2878,7 +2878,7 @@
             <a:fld id="{1D8BD707-D9CF-40AE-B4C6-C98DA3205C09}" type="datetimeFigureOut">
               <a:rPr lang="en-US" smtClean="0"/>
               <a:pPr/>
-              <a:t>11/8/23</a:t>
+              <a:t>11/9/23</a:t>
             </a:fld>
             <a:endParaRPr lang="en-US"/>
           </a:p>
@@ -3150,7 +3150,7 @@
             <a:fld id="{1D8BD707-D9CF-40AE-B4C6-C98DA3205C09}" type="datetimeFigureOut">
               <a:rPr lang="en-US" smtClean="0"/>
               <a:pPr/>
-              <a:t>11/8/23</a:t>
+              <a:t>11/9/23</a:t>
             </a:fld>
             <a:endParaRPr lang="en-US"/>
           </a:p>
@@ -3399,7 +3399,7 @@
             <a:fld id="{1D8BD707-D9CF-40AE-B4C6-C98DA3205C09}" type="datetimeFigureOut">
               <a:rPr lang="en-US" smtClean="0"/>
               <a:pPr/>
-              <a:t>11/8/23</a:t>
+              <a:t>11/9/23</a:t>
             </a:fld>
             <a:endParaRPr lang="en-US"/>
           </a:p>
@@ -3607,7 +3607,7 @@
             <a:fld id="{1D8BD707-D9CF-40AE-B4C6-C98DA3205C09}" type="datetimeFigureOut">
               <a:rPr lang="en-US" smtClean="0"/>
               <a:pPr/>
-              <a:t>11/8/23</a:t>
+              <a:t>11/9/23</a:t>
             </a:fld>
             <a:endParaRPr lang="en-US"/>
           </a:p>
@@ -7433,7 +7433,7 @@
         </p:nvGrpSpPr>
         <p:grpSpPr>
           <a:xfrm>
-            <a:off x="7976117" y="4357566"/>
+            <a:off x="7976117" y="4309941"/>
             <a:ext cx="2373866" cy="571373"/>
             <a:chOff x="0" y="0"/>
             <a:chExt cx="625216" cy="150485"/>
@@ -7676,7 +7676,7 @@
         <p:spPr>
           <a:xfrm>
             <a:off x="9163050" y="3780871"/>
-            <a:ext cx="0" cy="576695"/>
+            <a:ext cx="0" cy="529070"/>
           </a:xfrm>
           <a:prstGeom prst="line">
             <a:avLst/>
@@ -7706,7 +7706,7 @@
         </p:nvGrpSpPr>
         <p:grpSpPr>
           <a:xfrm>
-            <a:off x="12392565" y="4357566"/>
+            <a:off x="12393005" y="4309941"/>
             <a:ext cx="2373866" cy="571373"/>
             <a:chOff x="0" y="0"/>
             <a:chExt cx="625216" cy="150485"/>
@@ -7808,8 +7808,8 @@
         </p:nvSpPr>
         <p:spPr>
           <a:xfrm>
-            <a:off x="10349983" y="4643253"/>
-            <a:ext cx="2042582" cy="0"/>
+            <a:off x="10349983" y="4595628"/>
+            <a:ext cx="2043022" cy="0"/>
           </a:xfrm>
           <a:prstGeom prst="line">
             <a:avLst/>
@@ -7839,7 +7839,7 @@
         </p:nvGrpSpPr>
         <p:grpSpPr>
           <a:xfrm>
-            <a:off x="7686182" y="5719515"/>
+            <a:off x="5459724" y="5633790"/>
             <a:ext cx="2919389" cy="571373"/>
             <a:chOff x="0" y="0"/>
             <a:chExt cx="768893" cy="150485"/>
@@ -7941,8 +7941,8 @@
         </p:nvSpPr>
         <p:spPr>
           <a:xfrm flipH="1">
-            <a:off x="9145876" y="4928940"/>
-            <a:ext cx="17174" cy="790575"/>
+            <a:off x="6919419" y="4881315"/>
+            <a:ext cx="2243631" cy="752475"/>
           </a:xfrm>
           <a:prstGeom prst="line">
             <a:avLst/>
@@ -7972,7 +7972,7 @@
         </p:nvGrpSpPr>
         <p:grpSpPr>
           <a:xfrm>
-            <a:off x="7686182" y="6862005"/>
+            <a:off x="5459724" y="6728272"/>
             <a:ext cx="2919389" cy="571373"/>
             <a:chOff x="0" y="0"/>
             <a:chExt cx="768893" cy="150485"/>
@@ -8074,8 +8074,8 @@
         </p:nvSpPr>
         <p:spPr>
           <a:xfrm>
-            <a:off x="9145876" y="6290888"/>
-            <a:ext cx="0" cy="571117"/>
+            <a:off x="6919419" y="6205163"/>
+            <a:ext cx="0" cy="523110"/>
           </a:xfrm>
           <a:prstGeom prst="line">
             <a:avLst/>
@@ -8105,7 +8105,7 @@
         </p:nvGrpSpPr>
         <p:grpSpPr>
           <a:xfrm>
-            <a:off x="7674341" y="8022894"/>
+            <a:off x="5459724" y="7852096"/>
             <a:ext cx="2919389" cy="571373"/>
             <a:chOff x="0" y="0"/>
             <a:chExt cx="768893" cy="150485"/>
@@ -8207,7 +8207,7 @@
         </p:nvGrpSpPr>
         <p:grpSpPr>
           <a:xfrm>
-            <a:off x="5836358" y="9347435"/>
+            <a:off x="3609901" y="9261710"/>
             <a:ext cx="2919389" cy="571373"/>
             <a:chOff x="0" y="0"/>
             <a:chExt cx="768893" cy="150485"/>
@@ -8309,7 +8309,7 @@
         </p:nvGrpSpPr>
         <p:grpSpPr>
           <a:xfrm>
-            <a:off x="9473176" y="9347435"/>
+            <a:off x="7246719" y="9261710"/>
             <a:ext cx="2919389" cy="571373"/>
             <a:chOff x="0" y="0"/>
             <a:chExt cx="768893" cy="150485"/>
@@ -8410,9 +8410,9 @@
           <p:nvPr/>
         </p:nvSpPr>
         <p:spPr>
-          <a:xfrm flipH="1">
-            <a:off x="9134035" y="7433378"/>
-            <a:ext cx="11841" cy="589516"/>
+          <a:xfrm>
+            <a:off x="6919419" y="7299646"/>
+            <a:ext cx="0" cy="552450"/>
           </a:xfrm>
           <a:prstGeom prst="line">
             <a:avLst/>
@@ -8442,8 +8442,8 @@
         </p:nvSpPr>
         <p:spPr>
           <a:xfrm>
-            <a:off x="9134035" y="8594267"/>
-            <a:ext cx="1798835" cy="753168"/>
+            <a:off x="6919419" y="8423469"/>
+            <a:ext cx="1786994" cy="838242"/>
           </a:xfrm>
           <a:prstGeom prst="line">
             <a:avLst/>
@@ -8473,8 +8473,8 @@
         </p:nvSpPr>
         <p:spPr>
           <a:xfrm flipH="1">
-            <a:off x="7296052" y="8594267"/>
-            <a:ext cx="1837983" cy="753168"/>
+            <a:off x="5069595" y="8423469"/>
+            <a:ext cx="1849824" cy="838242"/>
           </a:xfrm>
           <a:prstGeom prst="line">
             <a:avLst/>
@@ -8504,7 +8504,7 @@
         </p:nvGrpSpPr>
         <p:grpSpPr>
           <a:xfrm>
-            <a:off x="3229515" y="5719515"/>
+            <a:off x="1003058" y="5633790"/>
             <a:ext cx="2919389" cy="571373"/>
             <a:chOff x="0" y="0"/>
             <a:chExt cx="768893" cy="150485"/>
@@ -8606,7 +8606,7 @@
         </p:nvGrpSpPr>
         <p:grpSpPr>
           <a:xfrm>
-            <a:off x="3229515" y="6813997"/>
+            <a:off x="1003058" y="6728272"/>
             <a:ext cx="2919389" cy="571373"/>
             <a:chOff x="0" y="0"/>
             <a:chExt cx="768893" cy="150485"/>
@@ -8708,7 +8708,7 @@
         </p:nvSpPr>
         <p:spPr>
           <a:xfrm>
-            <a:off x="4689210" y="6290888"/>
+            <a:off x="2462753" y="6205163"/>
             <a:ext cx="0" cy="523110"/>
           </a:xfrm>
           <a:prstGeom prst="line">
@@ -8739,7 +8739,7 @@
         </p:nvGrpSpPr>
         <p:grpSpPr>
           <a:xfrm>
-            <a:off x="12139096" y="5738510"/>
+            <a:off x="9912639" y="5652785"/>
             <a:ext cx="2919389" cy="571373"/>
             <a:chOff x="0" y="0"/>
             <a:chExt cx="768893" cy="150485"/>
@@ -8841,8 +8841,8 @@
         </p:nvSpPr>
         <p:spPr>
           <a:xfrm flipH="1">
-            <a:off x="4689210" y="4928940"/>
-            <a:ext cx="4473840" cy="790575"/>
+            <a:off x="2462753" y="4881315"/>
+            <a:ext cx="6700297" cy="752475"/>
           </a:xfrm>
           <a:prstGeom prst="line">
             <a:avLst/>
@@ -8872,8 +8872,8 @@
         </p:nvSpPr>
         <p:spPr>
           <a:xfrm>
-            <a:off x="9163050" y="4928940"/>
-            <a:ext cx="4435740" cy="809571"/>
+            <a:off x="9163050" y="4881315"/>
+            <a:ext cx="2209283" cy="771471"/>
           </a:xfrm>
           <a:prstGeom prst="line">
             <a:avLst/>
@@ -8895,6 +8895,255 @@
           </a:p>
         </p:txBody>
       </p:sp>
+      <p:grpSp>
+        <p:nvGrpSpPr>
+          <p:cNvPr id="50" name="Group 50"/>
+          <p:cNvGrpSpPr/>
+          <p:nvPr/>
+        </p:nvGrpSpPr>
+        <p:grpSpPr>
+          <a:xfrm>
+            <a:off x="14365553" y="5557590"/>
+            <a:ext cx="2919389" cy="647573"/>
+            <a:chOff x="0" y="0"/>
+            <a:chExt cx="768893" cy="170554"/>
+          </a:xfrm>
+        </p:grpSpPr>
+        <p:sp>
+          <p:nvSpPr>
+            <p:cNvPr id="51" name="Freeform 51"/>
+            <p:cNvSpPr/>
+            <p:nvPr/>
+          </p:nvSpPr>
+          <p:spPr>
+            <a:xfrm>
+              <a:off x="0" y="0"/>
+              <a:ext cx="768893" cy="170554"/>
+            </a:xfrm>
+            <a:custGeom>
+              <a:avLst/>
+              <a:gdLst/>
+              <a:ahLst/>
+              <a:cxnLst/>
+              <a:rect l="l" t="t" r="r" b="b"/>
+              <a:pathLst>
+                <a:path w="768893" h="170554">
+                  <a:moveTo>
+                    <a:pt x="0" y="0"/>
+                  </a:moveTo>
+                  <a:lnTo>
+                    <a:pt x="768893" y="0"/>
+                  </a:lnTo>
+                  <a:lnTo>
+                    <a:pt x="768893" y="170554"/>
+                  </a:lnTo>
+                  <a:lnTo>
+                    <a:pt x="0" y="170554"/>
+                  </a:lnTo>
+                  <a:close/>
+                </a:path>
+              </a:pathLst>
+            </a:custGeom>
+            <a:solidFill>
+              <a:srgbClr val="000000">
+                <a:alpha val="0"/>
+              </a:srgbClr>
+            </a:solidFill>
+            <a:ln w="38100" cap="sq">
+              <a:solidFill>
+                <a:srgbClr val="000000">
+                  <a:alpha val="80000"/>
+                </a:srgbClr>
+              </a:solidFill>
+              <a:prstDash val="dash"/>
+              <a:miter/>
+            </a:ln>
+          </p:spPr>
+          <p:txBody>
+            <a:bodyPr/>
+            <a:lstStyle/>
+            <a:p>
+              <a:endParaRPr lang="en-US"/>
+            </a:p>
+          </p:txBody>
+        </p:sp>
+        <p:sp>
+          <p:nvSpPr>
+            <p:cNvPr id="52" name="TextBox 52"/>
+            <p:cNvSpPr txBox="1"/>
+            <p:nvPr/>
+          </p:nvSpPr>
+          <p:spPr>
+            <a:xfrm>
+              <a:off x="0" y="-66675"/>
+              <a:ext cx="768893" cy="237229"/>
+            </a:xfrm>
+            <a:prstGeom prst="rect">
+              <a:avLst/>
+            </a:prstGeom>
+          </p:spPr>
+          <p:txBody>
+            <a:bodyPr lIns="50800" tIns="50800" rIns="50800" bIns="50800" rtlCol="0" anchor="ctr"/>
+            <a:lstStyle/>
+            <a:p>
+              <a:pPr algn="ctr">
+                <a:lnSpc>
+                  <a:spcPts val="2800"/>
+                </a:lnSpc>
+              </a:pPr>
+              <a:r>
+                <a:rPr lang="en-US" sz="2000">
+                  <a:solidFill>
+                    <a:srgbClr val="2A3F4D">
+                      <a:alpha val="80000"/>
+                    </a:srgbClr>
+                  </a:solidFill>
+                  <a:latin typeface="Poppins"/>
+                </a:rPr>
+                <a:t>Audit Logs</a:t>
+              </a:r>
+            </a:p>
+          </p:txBody>
+        </p:sp>
+      </p:grpSp>
+      <p:sp>
+        <p:nvSpPr>
+          <p:cNvPr id="53" name="AutoShape 53"/>
+          <p:cNvSpPr/>
+          <p:nvPr/>
+        </p:nvSpPr>
+        <p:spPr>
+          <a:xfrm>
+            <a:off x="9163050" y="4881315"/>
+            <a:ext cx="6662197" cy="676275"/>
+          </a:xfrm>
+          <a:prstGeom prst="line">
+            <a:avLst/>
+          </a:prstGeom>
+          <a:ln w="38100" cap="flat">
+            <a:solidFill>
+              <a:srgbClr val="2A3F4D"/>
+            </a:solidFill>
+            <a:prstDash val="solid"/>
+            <a:headEnd type="none" w="sm" len="sm"/>
+            <a:tailEnd type="triangle" w="lg" len="med"/>
+          </a:ln>
+        </p:spPr>
+        <p:txBody>
+          <a:bodyPr/>
+          <a:lstStyle/>
+          <a:p>
+            <a:endParaRPr lang="en-US"/>
+          </a:p>
+        </p:txBody>
+      </p:sp>
+      <p:grpSp>
+        <p:nvGrpSpPr>
+          <p:cNvPr id="54" name="Group 54"/>
+          <p:cNvGrpSpPr/>
+          <p:nvPr/>
+        </p:nvGrpSpPr>
+        <p:grpSpPr>
+          <a:xfrm>
+            <a:off x="14367342" y="6167063"/>
+            <a:ext cx="2919389" cy="449961"/>
+            <a:chOff x="0" y="0"/>
+            <a:chExt cx="768893" cy="118508"/>
+          </a:xfrm>
+        </p:grpSpPr>
+        <p:sp>
+          <p:nvSpPr>
+            <p:cNvPr id="55" name="Freeform 55"/>
+            <p:cNvSpPr/>
+            <p:nvPr/>
+          </p:nvSpPr>
+          <p:spPr>
+            <a:xfrm>
+              <a:off x="0" y="0"/>
+              <a:ext cx="768893" cy="118508"/>
+            </a:xfrm>
+            <a:custGeom>
+              <a:avLst/>
+              <a:gdLst/>
+              <a:ahLst/>
+              <a:cxnLst/>
+              <a:rect l="l" t="t" r="r" b="b"/>
+              <a:pathLst>
+                <a:path w="768893" h="118508">
+                  <a:moveTo>
+                    <a:pt x="0" y="0"/>
+                  </a:moveTo>
+                  <a:lnTo>
+                    <a:pt x="768893" y="0"/>
+                  </a:lnTo>
+                  <a:lnTo>
+                    <a:pt x="768893" y="118508"/>
+                  </a:lnTo>
+                  <a:lnTo>
+                    <a:pt x="0" y="118508"/>
+                  </a:lnTo>
+                  <a:close/>
+                </a:path>
+              </a:pathLst>
+            </a:custGeom>
+            <a:solidFill>
+              <a:srgbClr val="000000">
+                <a:alpha val="0"/>
+              </a:srgbClr>
+            </a:solidFill>
+            <a:ln cap="sq">
+              <a:noFill/>
+              <a:prstDash val="dash"/>
+              <a:miter/>
+            </a:ln>
+          </p:spPr>
+          <p:txBody>
+            <a:bodyPr/>
+            <a:lstStyle/>
+            <a:p>
+              <a:endParaRPr lang="en-US"/>
+            </a:p>
+          </p:txBody>
+        </p:sp>
+        <p:sp>
+          <p:nvSpPr>
+            <p:cNvPr id="56" name="TextBox 56"/>
+            <p:cNvSpPr txBox="1"/>
+            <p:nvPr/>
+          </p:nvSpPr>
+          <p:spPr>
+            <a:xfrm>
+              <a:off x="0" y="-47625"/>
+              <a:ext cx="768893" cy="166133"/>
+            </a:xfrm>
+            <a:prstGeom prst="rect">
+              <a:avLst/>
+            </a:prstGeom>
+          </p:spPr>
+          <p:txBody>
+            <a:bodyPr lIns="50800" tIns="50800" rIns="50800" bIns="50800" rtlCol="0" anchor="ctr"/>
+            <a:lstStyle/>
+            <a:p>
+              <a:pPr algn="ctr">
+                <a:lnSpc>
+                  <a:spcPts val="2100"/>
+                </a:lnSpc>
+              </a:pPr>
+              <a:r>
+                <a:rPr lang="en-US" sz="1500">
+                  <a:solidFill>
+                    <a:srgbClr val="2A3F4D">
+                      <a:alpha val="80000"/>
+                    </a:srgbClr>
+                  </a:solidFill>
+                  <a:latin typeface="Poppins"/>
+                </a:rPr>
+                <a:t>*for admin user only</a:t>
+              </a:r>
+            </a:p>
+          </p:txBody>
+        </p:sp>
+      </p:grpSp>
     </p:spTree>
   </p:cSld>
   <p:clrMapOvr>

</xml_diff>